<commit_message>
A0 poster + pdf
</commit_message>
<xml_diff>
--- a/posterA0.pptx
+++ b/posterA0.pptx
@@ -1560,7 +1560,7 @@
                 <a:spcPct val="100000"/>
               </a:lnSpc>
             </a:pPr>
-            <a:fld id="{B0AE2699-E687-44B2-A2AE-2A24A92B11A4}" type="datetime">
+            <a:fld id="{F0D8AB11-C655-494F-A3F5-37173B0D8796}" type="datetime">
               <a:rPr b="0" lang="en-GB" sz="900" spc="-1" strike="noStrike">
                 <a:solidFill>
                   <a:srgbClr val="8b8b8b"/>
@@ -1634,7 +1634,7 @@
                 <a:spcPct val="100000"/>
               </a:lnSpc>
             </a:pPr>
-            <a:fld id="{E72B255F-4F14-4AFB-A287-FE8C6BBEFE37}" type="slidenum">
+            <a:fld id="{EDDE9E51-42E0-4B30-82AA-8339D647C9F3}" type="slidenum">
               <a:rPr b="0" lang="en-GB" sz="900" spc="-1" strike="noStrike">
                 <a:solidFill>
                   <a:srgbClr val="8b8b8b"/>
@@ -3051,8 +3051,8 @@
         </p:blipFill>
         <p:spPr>
           <a:xfrm>
-            <a:off x="16560000" y="28919160"/>
-            <a:ext cx="13176000" cy="6292800"/>
+            <a:off x="16560000" y="28728000"/>
+            <a:ext cx="13576320" cy="6483960"/>
           </a:xfrm>
           <a:prstGeom prst="rect">
             <a:avLst/>

</xml_diff>